<commit_message>
Modified ML 4 slides.
</commit_message>
<xml_diff>
--- a/Lectures/19 Machine Learning IV Integrating ML .pptx
+++ b/Lectures/19 Machine Learning IV Integrating ML .pptx
@@ -5,10 +5,10 @@
     <p:sldMasterId id="2147483648" r:id="rId1"/>
   </p:sldMasterIdLst>
   <p:notesMasterIdLst>
-    <p:notesMasterId r:id="rId46"/>
+    <p:notesMasterId r:id="rId48"/>
   </p:notesMasterIdLst>
   <p:handoutMasterIdLst>
-    <p:handoutMasterId r:id="rId47"/>
+    <p:handoutMasterId r:id="rId49"/>
   </p:handoutMasterIdLst>
   <p:sldIdLst>
     <p:sldId id="258" r:id="rId2"/>
@@ -54,7 +54,9 @@
     <p:sldId id="796" r:id="rId42"/>
     <p:sldId id="797" r:id="rId43"/>
     <p:sldId id="792" r:id="rId44"/>
-    <p:sldId id="793" r:id="rId45"/>
+    <p:sldId id="798" r:id="rId45"/>
+    <p:sldId id="793" r:id="rId46"/>
+    <p:sldId id="799" r:id="rId47"/>
   </p:sldIdLst>
   <p:sldSz cx="9144000" cy="6858000" type="screen4x3"/>
   <p:notesSz cx="6858000" cy="9144000"/>
@@ -3477,7 +3479,175 @@
     </p:spTree>
     <p:extLst>
       <p:ext uri="{BB962C8B-B14F-4D97-AF65-F5344CB8AC3E}">
+        <p14:creationId xmlns:p14="http://schemas.microsoft.com/office/powerpoint/2010/main" val="623489508"/>
+      </p:ext>
+    </p:extLst>
+  </p:cSld>
+  <p:clrMapOvr>
+    <a:masterClrMapping/>
+  </p:clrMapOvr>
+</p:notes>
+</file>
+
+<file path=ppt/notesSlides/notesSlide35.xml><?xml version="1.0" encoding="utf-8"?>
+<p:notes xmlns:a="http://schemas.openxmlformats.org/drawingml/2006/main" xmlns:r="http://schemas.openxmlformats.org/officeDocument/2006/relationships" xmlns:p="http://schemas.openxmlformats.org/presentationml/2006/main">
+  <p:cSld>
+    <p:spTree>
+      <p:nvGrpSpPr>
+        <p:cNvPr id="1" name=""/>
+        <p:cNvGrpSpPr/>
+        <p:nvPr/>
+      </p:nvGrpSpPr>
+      <p:grpSpPr>
+        <a:xfrm>
+          <a:off x="0" y="0"/>
+          <a:ext cx="0" cy="0"/>
+          <a:chOff x="0" y="0"/>
+          <a:chExt cx="0" cy="0"/>
+        </a:xfrm>
+      </p:grpSpPr>
+      <p:sp>
+        <p:nvSpPr>
+          <p:cNvPr id="2" name="Slide Image Placeholder 1"/>
+          <p:cNvSpPr>
+            <a:spLocks noGrp="1" noRot="1" noChangeAspect="1"/>
+          </p:cNvSpPr>
+          <p:nvPr>
+            <p:ph type="sldImg"/>
+          </p:nvPr>
+        </p:nvSpPr>
+        <p:spPr/>
+      </p:sp>
+      <p:sp>
+        <p:nvSpPr>
+          <p:cNvPr id="3" name="Notes Placeholder 2"/>
+          <p:cNvSpPr>
+            <a:spLocks noGrp="1"/>
+          </p:cNvSpPr>
+          <p:nvPr>
+            <p:ph type="body" idx="1"/>
+          </p:nvPr>
+        </p:nvSpPr>
+        <p:spPr/>
+        <p:txBody>
+          <a:bodyPr/>
+          <a:lstStyle/>
+          <a:p>
+            <a:endParaRPr lang="en-US" dirty="0"/>
+          </a:p>
+        </p:txBody>
+      </p:sp>
+      <p:sp>
+        <p:nvSpPr>
+          <p:cNvPr id="4" name="Slide Number Placeholder 3"/>
+          <p:cNvSpPr>
+            <a:spLocks noGrp="1"/>
+          </p:cNvSpPr>
+          <p:nvPr>
+            <p:ph type="sldNum" sz="quarter" idx="10"/>
+          </p:nvPr>
+        </p:nvSpPr>
+        <p:spPr/>
+        <p:txBody>
+          <a:bodyPr/>
+          <a:lstStyle/>
+          <a:p>
+            <a:fld id="{FD66F34B-9C4D-8640-BB34-4C24A79C9FFB}" type="slidenum">
+              <a:rPr lang="en-US" smtClean="0"/>
+              <a:t>45</a:t>
+            </a:fld>
+            <a:endParaRPr lang="en-US"/>
+          </a:p>
+        </p:txBody>
+      </p:sp>
+    </p:spTree>
+    <p:extLst>
+      <p:ext uri="{BB962C8B-B14F-4D97-AF65-F5344CB8AC3E}">
         <p14:creationId xmlns:p14="http://schemas.microsoft.com/office/powerpoint/2010/main" val="767578196"/>
+      </p:ext>
+    </p:extLst>
+  </p:cSld>
+  <p:clrMapOvr>
+    <a:masterClrMapping/>
+  </p:clrMapOvr>
+</p:notes>
+</file>
+
+<file path=ppt/notesSlides/notesSlide36.xml><?xml version="1.0" encoding="utf-8"?>
+<p:notes xmlns:a="http://schemas.openxmlformats.org/drawingml/2006/main" xmlns:r="http://schemas.openxmlformats.org/officeDocument/2006/relationships" xmlns:p="http://schemas.openxmlformats.org/presentationml/2006/main">
+  <p:cSld>
+    <p:spTree>
+      <p:nvGrpSpPr>
+        <p:cNvPr id="1" name=""/>
+        <p:cNvGrpSpPr/>
+        <p:nvPr/>
+      </p:nvGrpSpPr>
+      <p:grpSpPr>
+        <a:xfrm>
+          <a:off x="0" y="0"/>
+          <a:ext cx="0" cy="0"/>
+          <a:chOff x="0" y="0"/>
+          <a:chExt cx="0" cy="0"/>
+        </a:xfrm>
+      </p:grpSpPr>
+      <p:sp>
+        <p:nvSpPr>
+          <p:cNvPr id="2" name="Slide Image Placeholder 1"/>
+          <p:cNvSpPr>
+            <a:spLocks noGrp="1" noRot="1" noChangeAspect="1"/>
+          </p:cNvSpPr>
+          <p:nvPr>
+            <p:ph type="sldImg"/>
+          </p:nvPr>
+        </p:nvSpPr>
+        <p:spPr/>
+      </p:sp>
+      <p:sp>
+        <p:nvSpPr>
+          <p:cNvPr id="3" name="Notes Placeholder 2"/>
+          <p:cNvSpPr>
+            <a:spLocks noGrp="1"/>
+          </p:cNvSpPr>
+          <p:nvPr>
+            <p:ph type="body" idx="1"/>
+          </p:nvPr>
+        </p:nvSpPr>
+        <p:spPr/>
+        <p:txBody>
+          <a:bodyPr/>
+          <a:lstStyle/>
+          <a:p>
+            <a:endParaRPr lang="en-US" dirty="0"/>
+          </a:p>
+        </p:txBody>
+      </p:sp>
+      <p:sp>
+        <p:nvSpPr>
+          <p:cNvPr id="4" name="Slide Number Placeholder 3"/>
+          <p:cNvSpPr>
+            <a:spLocks noGrp="1"/>
+          </p:cNvSpPr>
+          <p:nvPr>
+            <p:ph type="sldNum" sz="quarter" idx="10"/>
+          </p:nvPr>
+        </p:nvSpPr>
+        <p:spPr/>
+        <p:txBody>
+          <a:bodyPr/>
+          <a:lstStyle/>
+          <a:p>
+            <a:fld id="{FD66F34B-9C4D-8640-BB34-4C24A79C9FFB}" type="slidenum">
+              <a:rPr lang="en-US" smtClean="0"/>
+              <a:t>46</a:t>
+            </a:fld>
+            <a:endParaRPr lang="en-US"/>
+          </a:p>
+        </p:txBody>
+      </p:sp>
+    </p:spTree>
+    <p:extLst>
+      <p:ext uri="{BB962C8B-B14F-4D97-AF65-F5344CB8AC3E}">
+        <p14:creationId xmlns:p14="http://schemas.microsoft.com/office/powerpoint/2010/main" val="393609180"/>
       </p:ext>
     </p:extLst>
   </p:cSld>
@@ -32017,23 +32187,8 @@
           <a:p>
             <a:r>
               <a:rPr lang="en-US" dirty="0" smtClean="0"/>
-              <a:t>Continued learning:</a:t>
-            </a:r>
-          </a:p>
-          <a:p>
-            <a:pPr lvl="1"/>
-            <a:r>
-              <a:rPr lang="en-US" dirty="0" smtClean="0"/>
-              <a:t>Online learning</a:t>
-            </a:r>
-          </a:p>
-          <a:p>
-            <a:pPr lvl="1"/>
-            <a:r>
-              <a:rPr lang="en-US" smtClean="0"/>
-              <a:t>Active learning</a:t>
-            </a:r>
-            <a:endParaRPr lang="en-US" dirty="0"/>
+              <a:t>Assessing performance over time</a:t>
+            </a:r>
           </a:p>
         </p:txBody>
       </p:sp>
@@ -32105,7 +32260,377 @@
     </p:spTree>
     <p:extLst>
       <p:ext uri="{BB962C8B-B14F-4D97-AF65-F5344CB8AC3E}">
+        <p14:creationId xmlns:p14="http://schemas.microsoft.com/office/powerpoint/2010/main" val="235523047"/>
+      </p:ext>
+    </p:extLst>
+  </p:cSld>
+  <p:clrMapOvr>
+    <a:masterClrMapping/>
+  </p:clrMapOvr>
+  <p:timing>
+    <p:tnLst>
+      <p:par>
+        <p:cTn id="1" dur="indefinite" restart="never" nodeType="tmRoot"/>
+      </p:par>
+    </p:tnLst>
+  </p:timing>
+</p:sld>
+</file>
+
+<file path=ppt/slides/slide45.xml><?xml version="1.0" encoding="utf-8"?>
+<p:sld xmlns:a="http://schemas.openxmlformats.org/drawingml/2006/main" xmlns:r="http://schemas.openxmlformats.org/officeDocument/2006/relationships" xmlns:p="http://schemas.openxmlformats.org/presentationml/2006/main">
+  <p:cSld>
+    <p:spTree>
+      <p:nvGrpSpPr>
+        <p:cNvPr id="1" name=""/>
+        <p:cNvGrpSpPr/>
+        <p:nvPr/>
+      </p:nvGrpSpPr>
+      <p:grpSpPr>
+        <a:xfrm>
+          <a:off x="0" y="0"/>
+          <a:ext cx="0" cy="0"/>
+          <a:chOff x="0" y="0"/>
+          <a:chExt cx="0" cy="0"/>
+        </a:xfrm>
+      </p:grpSpPr>
+      <p:sp>
+        <p:nvSpPr>
+          <p:cNvPr id="2" name="Title 1"/>
+          <p:cNvSpPr>
+            <a:spLocks noGrp="1"/>
+          </p:cNvSpPr>
+          <p:nvPr>
+            <p:ph type="title"/>
+          </p:nvPr>
+        </p:nvSpPr>
+        <p:spPr/>
+        <p:txBody>
+          <a:bodyPr/>
+          <a:lstStyle/>
+          <a:p>
+            <a:r>
+              <a:rPr lang="en-US" dirty="0" smtClean="0"/>
+              <a:t>Integrating ML</a:t>
+            </a:r>
+            <a:br>
+              <a:rPr lang="en-US" dirty="0" smtClean="0"/>
+            </a:br>
+            <a:r>
+              <a:rPr lang="en-US" dirty="0" smtClean="0"/>
+              <a:t>into Interactive Systems</a:t>
+            </a:r>
+            <a:endParaRPr lang="en-US" dirty="0"/>
+          </a:p>
+        </p:txBody>
+      </p:sp>
+      <p:sp>
+        <p:nvSpPr>
+          <p:cNvPr id="3" name="Content Placeholder 2"/>
+          <p:cNvSpPr>
+            <a:spLocks noGrp="1"/>
+          </p:cNvSpPr>
+          <p:nvPr>
+            <p:ph idx="1"/>
+          </p:nvPr>
+        </p:nvSpPr>
+        <p:spPr/>
+        <p:txBody>
+          <a:bodyPr/>
+          <a:lstStyle/>
+          <a:p>
+            <a:r>
+              <a:rPr lang="en-US" dirty="0" smtClean="0"/>
+              <a:t>Real-time Classification</a:t>
+            </a:r>
+          </a:p>
+          <a:p>
+            <a:r>
+              <a:rPr lang="en-US" dirty="0"/>
+              <a:t>Assessing performance over </a:t>
+            </a:r>
+            <a:r>
+              <a:rPr lang="en-US" dirty="0" smtClean="0"/>
+              <a:t>time</a:t>
+            </a:r>
+          </a:p>
+          <a:p>
+            <a:r>
+              <a:rPr lang="en-US" dirty="0" smtClean="0"/>
+              <a:t>Continued learning:</a:t>
+            </a:r>
+          </a:p>
+          <a:p>
+            <a:pPr lvl="1"/>
+            <a:r>
+              <a:rPr lang="en-US" dirty="0" smtClean="0"/>
+              <a:t>Online learning</a:t>
+            </a:r>
+          </a:p>
+          <a:p>
+            <a:pPr lvl="1"/>
+            <a:r>
+              <a:rPr lang="en-US" dirty="0" smtClean="0"/>
+              <a:t>Active learning</a:t>
+            </a:r>
+            <a:endParaRPr lang="en-US" dirty="0"/>
+          </a:p>
+        </p:txBody>
+      </p:sp>
+      <p:sp>
+        <p:nvSpPr>
+          <p:cNvPr id="4" name="Date Placeholder 3"/>
+          <p:cNvSpPr>
+            <a:spLocks noGrp="1"/>
+          </p:cNvSpPr>
+          <p:nvPr>
+            <p:ph type="dt" sz="half" idx="10"/>
+          </p:nvPr>
+        </p:nvSpPr>
+        <p:spPr/>
+        <p:txBody>
+          <a:bodyPr/>
+          <a:lstStyle/>
+          <a:p>
+            <a:fld id="{7053BEFA-1175-F644-B249-7D41D72BD3FF}" type="datetime1">
+              <a:rPr lang="en-US" smtClean="0"/>
+              <a:t>4/11/17</a:t>
+            </a:fld>
+            <a:endParaRPr lang="en-US"/>
+          </a:p>
+        </p:txBody>
+      </p:sp>
+      <p:sp>
+        <p:nvSpPr>
+          <p:cNvPr id="5" name="Footer Placeholder 4"/>
+          <p:cNvSpPr>
+            <a:spLocks noGrp="1"/>
+          </p:cNvSpPr>
+          <p:nvPr>
+            <p:ph type="ftr" sz="quarter" idx="11"/>
+          </p:nvPr>
+        </p:nvSpPr>
+        <p:spPr/>
+        <p:txBody>
+          <a:bodyPr/>
+          <a:lstStyle/>
+          <a:p>
+            <a:endParaRPr lang="en-US" dirty="0"/>
+          </a:p>
+        </p:txBody>
+      </p:sp>
+      <p:sp>
+        <p:nvSpPr>
+          <p:cNvPr id="6" name="Slide Number Placeholder 5"/>
+          <p:cNvSpPr>
+            <a:spLocks noGrp="1"/>
+          </p:cNvSpPr>
+          <p:nvPr>
+            <p:ph type="sldNum" sz="quarter" idx="12"/>
+          </p:nvPr>
+        </p:nvSpPr>
+        <p:spPr/>
+        <p:txBody>
+          <a:bodyPr/>
+          <a:lstStyle/>
+          <a:p>
+            <a:fld id="{17E276FA-8F89-B34D-A726-BE3FA1F8DD97}" type="slidenum">
+              <a:rPr lang="en-US" smtClean="0"/>
+              <a:t>45</a:t>
+            </a:fld>
+            <a:endParaRPr lang="en-US" dirty="0"/>
+          </a:p>
+        </p:txBody>
+      </p:sp>
+    </p:spTree>
+    <p:extLst>
+      <p:ext uri="{BB962C8B-B14F-4D97-AF65-F5344CB8AC3E}">
         <p14:creationId xmlns:p14="http://schemas.microsoft.com/office/powerpoint/2010/main" val="1470459296"/>
+      </p:ext>
+    </p:extLst>
+  </p:cSld>
+  <p:clrMapOvr>
+    <a:masterClrMapping/>
+  </p:clrMapOvr>
+  <p:timing>
+    <p:tnLst>
+      <p:par>
+        <p:cTn id="1" dur="indefinite" restart="never" nodeType="tmRoot"/>
+      </p:par>
+    </p:tnLst>
+  </p:timing>
+</p:sld>
+</file>
+
+<file path=ppt/slides/slide46.xml><?xml version="1.0" encoding="utf-8"?>
+<p:sld xmlns:a="http://schemas.openxmlformats.org/drawingml/2006/main" xmlns:r="http://schemas.openxmlformats.org/officeDocument/2006/relationships" xmlns:p="http://schemas.openxmlformats.org/presentationml/2006/main">
+  <p:cSld>
+    <p:spTree>
+      <p:nvGrpSpPr>
+        <p:cNvPr id="1" name=""/>
+        <p:cNvGrpSpPr/>
+        <p:nvPr/>
+      </p:nvGrpSpPr>
+      <p:grpSpPr>
+        <a:xfrm>
+          <a:off x="0" y="0"/>
+          <a:ext cx="0" cy="0"/>
+          <a:chOff x="0" y="0"/>
+          <a:chExt cx="0" cy="0"/>
+        </a:xfrm>
+      </p:grpSpPr>
+      <p:sp>
+        <p:nvSpPr>
+          <p:cNvPr id="2" name="Title 1"/>
+          <p:cNvSpPr>
+            <a:spLocks noGrp="1"/>
+          </p:cNvSpPr>
+          <p:nvPr>
+            <p:ph type="title"/>
+          </p:nvPr>
+        </p:nvSpPr>
+        <p:spPr/>
+        <p:txBody>
+          <a:bodyPr/>
+          <a:lstStyle/>
+          <a:p>
+            <a:r>
+              <a:rPr lang="en-US" smtClean="0"/>
+              <a:t>What’s next?</a:t>
+            </a:r>
+            <a:endParaRPr lang="en-US" dirty="0"/>
+          </a:p>
+        </p:txBody>
+      </p:sp>
+      <p:sp>
+        <p:nvSpPr>
+          <p:cNvPr id="4" name="Date Placeholder 3"/>
+          <p:cNvSpPr>
+            <a:spLocks noGrp="1"/>
+          </p:cNvSpPr>
+          <p:nvPr>
+            <p:ph type="dt" sz="half" idx="10"/>
+          </p:nvPr>
+        </p:nvSpPr>
+        <p:spPr/>
+        <p:txBody>
+          <a:bodyPr/>
+          <a:lstStyle/>
+          <a:p>
+            <a:fld id="{7053BEFA-1175-F644-B249-7D41D72BD3FF}" type="datetime1">
+              <a:rPr lang="en-US" smtClean="0"/>
+              <a:t>4/11/17</a:t>
+            </a:fld>
+            <a:endParaRPr lang="en-US"/>
+          </a:p>
+        </p:txBody>
+      </p:sp>
+      <p:sp>
+        <p:nvSpPr>
+          <p:cNvPr id="5" name="Footer Placeholder 4"/>
+          <p:cNvSpPr>
+            <a:spLocks noGrp="1"/>
+          </p:cNvSpPr>
+          <p:nvPr>
+            <p:ph type="ftr" sz="quarter" idx="11"/>
+          </p:nvPr>
+        </p:nvSpPr>
+        <p:spPr/>
+        <p:txBody>
+          <a:bodyPr/>
+          <a:lstStyle/>
+          <a:p>
+            <a:endParaRPr lang="en-US" dirty="0"/>
+          </a:p>
+        </p:txBody>
+      </p:sp>
+      <p:sp>
+        <p:nvSpPr>
+          <p:cNvPr id="6" name="Slide Number Placeholder 5"/>
+          <p:cNvSpPr>
+            <a:spLocks noGrp="1"/>
+          </p:cNvSpPr>
+          <p:nvPr>
+            <p:ph type="sldNum" sz="quarter" idx="12"/>
+          </p:nvPr>
+        </p:nvSpPr>
+        <p:spPr/>
+        <p:txBody>
+          <a:bodyPr/>
+          <a:lstStyle/>
+          <a:p>
+            <a:fld id="{17E276FA-8F89-B34D-A726-BE3FA1F8DD97}" type="slidenum">
+              <a:rPr lang="en-US" smtClean="0"/>
+              <a:t>46</a:t>
+            </a:fld>
+            <a:endParaRPr lang="en-US" dirty="0"/>
+          </a:p>
+        </p:txBody>
+      </p:sp>
+      <p:pic>
+        <p:nvPicPr>
+          <p:cNvPr id="8" name="Picture 7"/>
+          <p:cNvPicPr>
+            <a:picLocks noChangeAspect="1"/>
+          </p:cNvPicPr>
+          <p:nvPr/>
+        </p:nvPicPr>
+        <p:blipFill>
+          <a:blip r:embed="rId3">
+            <a:extLst>
+              <a:ext uri="{28A0092B-C50C-407E-A947-70E740481C1C}">
+                <a14:useLocalDpi xmlns:a14="http://schemas.microsoft.com/office/drawing/2010/main" val="0"/>
+              </a:ext>
+            </a:extLst>
+          </a:blip>
+          <a:stretch>
+            <a:fillRect/>
+          </a:stretch>
+        </p:blipFill>
+        <p:spPr>
+          <a:xfrm>
+            <a:off x="1116941" y="1713675"/>
+            <a:ext cx="2520696" cy="3432048"/>
+          </a:xfrm>
+          <a:prstGeom prst="rect">
+            <a:avLst/>
+          </a:prstGeom>
+        </p:spPr>
+      </p:pic>
+      <p:pic>
+        <p:nvPicPr>
+          <p:cNvPr id="9" name="Picture 8"/>
+          <p:cNvPicPr>
+            <a:picLocks noChangeAspect="1"/>
+          </p:cNvPicPr>
+          <p:nvPr/>
+        </p:nvPicPr>
+        <p:blipFill>
+          <a:blip r:embed="rId4">
+            <a:extLst>
+              <a:ext uri="{28A0092B-C50C-407E-A947-70E740481C1C}">
+                <a14:useLocalDpi xmlns:a14="http://schemas.microsoft.com/office/drawing/2010/main" val="0"/>
+              </a:ext>
+            </a:extLst>
+          </a:blip>
+          <a:stretch>
+            <a:fillRect/>
+          </a:stretch>
+        </p:blipFill>
+        <p:spPr>
+          <a:xfrm>
+            <a:off x="4094352" y="1453394"/>
+            <a:ext cx="4572000" cy="3952609"/>
+          </a:xfrm>
+          <a:prstGeom prst="rect">
+            <a:avLst/>
+          </a:prstGeom>
+        </p:spPr>
+      </p:pic>
+    </p:spTree>
+    <p:extLst>
+      <p:ext uri="{BB962C8B-B14F-4D97-AF65-F5344CB8AC3E}">
+        <p14:creationId xmlns:p14="http://schemas.microsoft.com/office/powerpoint/2010/main" val="1745149358"/>
       </p:ext>
     </p:extLst>
   </p:cSld>

</xml_diff>